<commit_message>
Added to R markdown
</commit_message>
<xml_diff>
--- a/figures/NRG Stimulation 2015.pptx
+++ b/figures/NRG Stimulation 2015.pptx
@@ -5,7 +5,7 @@
     <p:sldMasterId id="2147483648" r:id="rId1"/>
   </p:sldMasterIdLst>
   <p:notesMasterIdLst>
-    <p:notesMasterId r:id="rId12"/>
+    <p:notesMasterId r:id="rId14"/>
   </p:notesMasterIdLst>
   <p:sldIdLst>
     <p:sldId id="256" r:id="rId2"/>
@@ -13,11 +13,13 @@
     <p:sldId id="257" r:id="rId4"/>
     <p:sldId id="258" r:id="rId5"/>
     <p:sldId id="260" r:id="rId6"/>
-    <p:sldId id="267" r:id="rId7"/>
-    <p:sldId id="259" r:id="rId8"/>
+    <p:sldId id="259" r:id="rId7"/>
+    <p:sldId id="268" r:id="rId8"/>
     <p:sldId id="261" r:id="rId9"/>
     <p:sldId id="263" r:id="rId10"/>
     <p:sldId id="265" r:id="rId11"/>
+    <p:sldId id="269" r:id="rId12"/>
+    <p:sldId id="267" r:id="rId13"/>
   </p:sldIdLst>
   <p:sldSz cx="9144000" cy="6858000" type="screen4x3"/>
   <p:notesSz cx="6858000" cy="9144000"/>
@@ -3963,6 +3965,272 @@
 </p:sld>
 </file>
 
+<file path=ppt/slides/slide11.xml><?xml version="1.0" encoding="utf-8"?>
+<p:sld xmlns:a="http://schemas.openxmlformats.org/drawingml/2006/main" xmlns:r="http://schemas.openxmlformats.org/officeDocument/2006/relationships" xmlns:p="http://schemas.openxmlformats.org/presentationml/2006/main">
+  <p:cSld>
+    <p:spTree>
+      <p:nvGrpSpPr>
+        <p:cNvPr id="1" name=""/>
+        <p:cNvGrpSpPr/>
+        <p:nvPr/>
+      </p:nvGrpSpPr>
+      <p:grpSpPr>
+        <a:xfrm>
+          <a:off x="0" y="0"/>
+          <a:ext cx="0" cy="0"/>
+          <a:chOff x="0" y="0"/>
+          <a:chExt cx="0" cy="0"/>
+        </a:xfrm>
+      </p:grpSpPr>
+      <p:sp>
+        <p:nvSpPr>
+          <p:cNvPr id="2" name="Title 1"/>
+          <p:cNvSpPr>
+            <a:spLocks noGrp="1"/>
+          </p:cNvSpPr>
+          <p:nvPr>
+            <p:ph type="title"/>
+          </p:nvPr>
+        </p:nvSpPr>
+        <p:spPr/>
+        <p:txBody>
+          <a:bodyPr/>
+          <a:lstStyle/>
+          <a:p>
+            <a:r>
+              <a:rPr lang="en-US" dirty="0" smtClean="0"/>
+              <a:t>Step-Ramp-Gap-</a:t>
+            </a:r>
+            <a:r>
+              <a:rPr lang="en-US" dirty="0" err="1" smtClean="0"/>
+              <a:t>Stim</a:t>
+            </a:r>
+            <a:endParaRPr lang="en-US" dirty="0"/>
+          </a:p>
+        </p:txBody>
+      </p:sp>
+      <p:pic>
+        <p:nvPicPr>
+          <p:cNvPr id="6" name="Picture 2" descr="C:\Users\adam2\Documents\MATLAB\NRGStimAnalysis\figures\pursuit-stim-head example.png"/>
+          <p:cNvPicPr>
+            <a:picLocks noGrp="1" noChangeAspect="1" noChangeArrowheads="1"/>
+          </p:cNvPicPr>
+          <p:nvPr>
+            <p:ph sz="half" idx="1"/>
+          </p:nvPr>
+        </p:nvPicPr>
+        <p:blipFill>
+          <a:blip r:embed="rId2">
+            <a:extLst>
+              <a:ext uri="{28A0092B-C50C-407E-A947-70E740481C1C}">
+                <a14:useLocalDpi xmlns:a14="http://schemas.microsoft.com/office/drawing/2010/main" val="0"/>
+              </a:ext>
+            </a:extLst>
+          </a:blip>
+          <a:srcRect/>
+          <a:stretch>
+            <a:fillRect/>
+          </a:stretch>
+        </p:blipFill>
+        <p:spPr bwMode="auto">
+          <a:xfrm>
+            <a:off x="457200" y="2430659"/>
+            <a:ext cx="4038600" cy="2865045"/>
+          </a:xfrm>
+          <a:prstGeom prst="rect">
+            <a:avLst/>
+          </a:prstGeom>
+          <a:noFill/>
+          <a:extLst>
+            <a:ext uri="{909E8E84-426E-40DD-AFC4-6F175D3DCCD1}">
+              <a14:hiddenFill xmlns:a14="http://schemas.microsoft.com/office/drawing/2010/main">
+                <a:solidFill>
+                  <a:srgbClr val="FFFFFF"/>
+                </a:solidFill>
+              </a14:hiddenFill>
+            </a:ext>
+          </a:extLst>
+        </p:spPr>
+      </p:pic>
+      <p:pic>
+        <p:nvPicPr>
+          <p:cNvPr id="8" name="Picture 3" descr="C:\Users\adam2\Documents\MATLAB\NRGStimAnalysis\figures\pursuit-stim-eye example.png"/>
+          <p:cNvPicPr>
+            <a:picLocks noGrp="1" noChangeAspect="1" noChangeArrowheads="1"/>
+          </p:cNvPicPr>
+          <p:nvPr>
+            <p:ph sz="half" idx="2"/>
+          </p:nvPr>
+        </p:nvPicPr>
+        <p:blipFill>
+          <a:blip r:embed="rId3">
+            <a:extLst>
+              <a:ext uri="{28A0092B-C50C-407E-A947-70E740481C1C}">
+                <a14:useLocalDpi xmlns:a14="http://schemas.microsoft.com/office/drawing/2010/main" val="0"/>
+              </a:ext>
+            </a:extLst>
+          </a:blip>
+          <a:srcRect/>
+          <a:stretch>
+            <a:fillRect/>
+          </a:stretch>
+        </p:blipFill>
+        <p:spPr bwMode="auto">
+          <a:xfrm>
+            <a:off x="4648200" y="2348707"/>
+            <a:ext cx="4038600" cy="3028949"/>
+          </a:xfrm>
+          <a:prstGeom prst="rect">
+            <a:avLst/>
+          </a:prstGeom>
+          <a:noFill/>
+          <a:extLst>
+            <a:ext uri="{909E8E84-426E-40DD-AFC4-6F175D3DCCD1}">
+              <a14:hiddenFill xmlns:a14="http://schemas.microsoft.com/office/drawing/2010/main">
+                <a:solidFill>
+                  <a:srgbClr val="FFFFFF"/>
+                </a:solidFill>
+              </a14:hiddenFill>
+            </a:ext>
+          </a:extLst>
+        </p:spPr>
+      </p:pic>
+    </p:spTree>
+    <p:extLst>
+      <p:ext uri="{BB962C8B-B14F-4D97-AF65-F5344CB8AC3E}">
+        <p14:creationId xmlns:p14="http://schemas.microsoft.com/office/powerpoint/2010/main" val="2828118767"/>
+      </p:ext>
+    </p:extLst>
+  </p:cSld>
+  <p:clrMapOvr>
+    <a:masterClrMapping/>
+  </p:clrMapOvr>
+  <p:timing>
+    <p:tnLst>
+      <p:par>
+        <p:cTn id="1" dur="indefinite" restart="never" nodeType="tmRoot"/>
+      </p:par>
+    </p:tnLst>
+  </p:timing>
+</p:sld>
+</file>
+
+<file path=ppt/slides/slide12.xml><?xml version="1.0" encoding="utf-8"?>
+<p:sld xmlns:a="http://schemas.openxmlformats.org/drawingml/2006/main" xmlns:r="http://schemas.openxmlformats.org/officeDocument/2006/relationships" xmlns:p="http://schemas.openxmlformats.org/presentationml/2006/main">
+  <p:cSld>
+    <p:spTree>
+      <p:nvGrpSpPr>
+        <p:cNvPr id="1" name=""/>
+        <p:cNvGrpSpPr/>
+        <p:nvPr/>
+      </p:nvGrpSpPr>
+      <p:grpSpPr>
+        <a:xfrm>
+          <a:off x="0" y="0"/>
+          <a:ext cx="0" cy="0"/>
+          <a:chOff x="0" y="0"/>
+          <a:chExt cx="0" cy="0"/>
+        </a:xfrm>
+      </p:grpSpPr>
+      <p:pic>
+        <p:nvPicPr>
+          <p:cNvPr id="5" name="Picture 2" descr="C:\Users\adam2\Desktop\AllLatencyScatter.png"/>
+          <p:cNvPicPr>
+            <a:picLocks noGrp="1" noChangeAspect="1" noChangeArrowheads="1"/>
+          </p:cNvPicPr>
+          <p:nvPr>
+            <p:ph idx="1"/>
+          </p:nvPr>
+        </p:nvPicPr>
+        <p:blipFill>
+          <a:blip r:embed="rId2">
+            <a:extLst>
+              <a:ext uri="{28A0092B-C50C-407E-A947-70E740481C1C}">
+                <a14:useLocalDpi xmlns:a14="http://schemas.microsoft.com/office/drawing/2010/main" val="0"/>
+              </a:ext>
+            </a:extLst>
+          </a:blip>
+          <a:srcRect/>
+          <a:stretch>
+            <a:fillRect/>
+          </a:stretch>
+        </p:blipFill>
+        <p:spPr bwMode="auto">
+          <a:xfrm>
+            <a:off x="1752600" y="685800"/>
+            <a:ext cx="5479851" cy="3974264"/>
+          </a:xfrm>
+          <a:prstGeom prst="rect">
+            <a:avLst/>
+          </a:prstGeom>
+          <a:noFill/>
+          <a:extLst>
+            <a:ext uri="{909E8E84-426E-40DD-AFC4-6F175D3DCCD1}">
+              <a14:hiddenFill xmlns:a14="http://schemas.microsoft.com/office/drawing/2010/main">
+                <a:solidFill>
+                  <a:srgbClr val="FFFFFF"/>
+                </a:solidFill>
+              </a14:hiddenFill>
+            </a:ext>
+          </a:extLst>
+        </p:spPr>
+      </p:pic>
+      <p:sp>
+        <p:nvSpPr>
+          <p:cNvPr id="4" name="TextBox 3"/>
+          <p:cNvSpPr txBox="1"/>
+          <p:nvPr/>
+        </p:nvSpPr>
+        <p:spPr>
+          <a:xfrm>
+            <a:off x="304800" y="4800600"/>
+            <a:ext cx="8229600" cy="1477328"/>
+          </a:xfrm>
+          <a:prstGeom prst="rect">
+            <a:avLst/>
+          </a:prstGeom>
+          <a:noFill/>
+        </p:spPr>
+        <p:txBody>
+          <a:bodyPr wrap="square" rtlCol="0">
+            <a:spAutoFit/>
+          </a:bodyPr>
+          <a:lstStyle/>
+          <a:p>
+            <a:r>
+              <a:rPr lang="en-US" dirty="0" smtClean="0"/>
+              <a:t>Comparing the latency of the stimulus-evoked movements during stimulation during fixation and during movements to the left and right. The open squares indicate the mean latency of each type. The line y=x is shown. </a:t>
+            </a:r>
+            <a:endParaRPr lang="en-US" dirty="0"/>
+          </a:p>
+          <a:p>
+            <a:r>
+              <a:rPr lang="en-US" dirty="0" smtClean="0"/>
+              <a:t>This analysis shows there is no detectable change in eye movement before the head begins to move. This is consistent with VOR as the source of the eye movements</a:t>
+            </a:r>
+          </a:p>
+        </p:txBody>
+      </p:sp>
+    </p:spTree>
+    <p:extLst>
+      <p:ext uri="{BB962C8B-B14F-4D97-AF65-F5344CB8AC3E}">
+        <p14:creationId xmlns:p14="http://schemas.microsoft.com/office/powerpoint/2010/main" val="2769463264"/>
+      </p:ext>
+    </p:extLst>
+  </p:cSld>
+  <p:clrMapOvr>
+    <a:masterClrMapping/>
+  </p:clrMapOvr>
+  <p:timing>
+    <p:tnLst>
+      <p:par>
+        <p:cTn id="1" dur="indefinite" restart="never" nodeType="tmRoot"/>
+      </p:par>
+    </p:tnLst>
+  </p:timing>
+</p:sld>
+</file>
+
 <file path=ppt/slides/slide2.xml><?xml version="1.0" encoding="utf-8"?>
 <p:sld xmlns:a="http://schemas.openxmlformats.org/drawingml/2006/main" xmlns:r="http://schemas.openxmlformats.org/officeDocument/2006/relationships" xmlns:p="http://schemas.openxmlformats.org/presentationml/2006/main">
   <p:cSld>
@@ -4463,140 +4731,38 @@
           <a:chExt cx="0" cy="0"/>
         </a:xfrm>
       </p:grpSpPr>
-      <p:pic>
-        <p:nvPicPr>
-          <p:cNvPr id="5" name="Picture 2" descr="C:\Users\adam2\Desktop\AllLatencyScatter.png"/>
-          <p:cNvPicPr>
-            <a:picLocks noGrp="1" noChangeAspect="1" noChangeArrowheads="1"/>
-          </p:cNvPicPr>
-          <p:nvPr>
-            <p:ph idx="1"/>
-          </p:nvPr>
-        </p:nvPicPr>
-        <p:blipFill>
-          <a:blip r:embed="rId2">
-            <a:extLst>
-              <a:ext uri="{28A0092B-C50C-407E-A947-70E740481C1C}">
-                <a14:useLocalDpi xmlns:a14="http://schemas.microsoft.com/office/drawing/2010/main" val="0"/>
-              </a:ext>
-            </a:extLst>
-          </a:blip>
-          <a:srcRect/>
-          <a:stretch>
-            <a:fillRect/>
-          </a:stretch>
-        </p:blipFill>
-        <p:spPr bwMode="auto">
-          <a:xfrm>
-            <a:off x="1752600" y="685800"/>
-            <a:ext cx="5479851" cy="3974264"/>
-          </a:xfrm>
-          <a:prstGeom prst="rect">
-            <a:avLst/>
-          </a:prstGeom>
-          <a:noFill/>
-          <a:extLst>
-            <a:ext uri="{909E8E84-426E-40DD-AFC4-6F175D3DCCD1}">
-              <a14:hiddenFill xmlns:a14="http://schemas.microsoft.com/office/drawing/2010/main">
-                <a:solidFill>
-                  <a:srgbClr val="FFFFFF"/>
-                </a:solidFill>
-              </a14:hiddenFill>
-            </a:ext>
-          </a:extLst>
-        </p:spPr>
-      </p:pic>
-      <p:sp>
-        <p:nvSpPr>
-          <p:cNvPr id="4" name="TextBox 3"/>
-          <p:cNvSpPr txBox="1"/>
-          <p:nvPr/>
-        </p:nvSpPr>
-        <p:spPr>
-          <a:xfrm>
-            <a:off x="304800" y="4800600"/>
-            <a:ext cx="8229600" cy="1477328"/>
-          </a:xfrm>
-          <a:prstGeom prst="rect">
-            <a:avLst/>
-          </a:prstGeom>
-          <a:noFill/>
-        </p:spPr>
-        <p:txBody>
-          <a:bodyPr wrap="square" rtlCol="0">
-            <a:spAutoFit/>
+      <p:sp>
+        <p:nvSpPr>
+          <p:cNvPr id="2" name="Title 1"/>
+          <p:cNvSpPr>
+            <a:spLocks noGrp="1"/>
+          </p:cNvSpPr>
+          <p:nvPr>
+            <p:ph type="title"/>
+          </p:nvPr>
+        </p:nvSpPr>
+        <p:spPr/>
+        <p:txBody>
+          <a:bodyPr>
+            <a:normAutofit fontScale="90000"/>
           </a:bodyPr>
           <a:lstStyle/>
           <a:p>
             <a:r>
               <a:rPr lang="en-US" dirty="0" smtClean="0"/>
-              <a:t>Comparing the latency of the stimulus-evoked movements during stimulation during fixation and during movements to the left and right. The open squares indicate the mean latency of each type. The line y=x is shown. </a:t>
-            </a:r>
-            <a:endParaRPr lang="en-US" dirty="0"/>
-          </a:p>
-          <a:p>
+              <a:t>Fixation-Gap-</a:t>
+            </a:r>
+            <a:r>
+              <a:rPr lang="en-US" dirty="0" err="1" smtClean="0"/>
+              <a:t>Stim</a:t>
+            </a:r>
             <a:r>
               <a:rPr lang="en-US" dirty="0" smtClean="0"/>
-              <a:t>This analysis shows there is no detectable change in eye movement before the head begins to move. This is consistent with VOR as the source of the eye movements</a:t>
-            </a:r>
-          </a:p>
-        </p:txBody>
-      </p:sp>
-    </p:spTree>
-    <p:extLst>
-      <p:ext uri="{BB962C8B-B14F-4D97-AF65-F5344CB8AC3E}">
-        <p14:creationId xmlns:p14="http://schemas.microsoft.com/office/powerpoint/2010/main" val="2769463264"/>
-      </p:ext>
-    </p:extLst>
-  </p:cSld>
-  <p:clrMapOvr>
-    <a:masterClrMapping/>
-  </p:clrMapOvr>
-  <p:timing>
-    <p:tnLst>
-      <p:par>
-        <p:cTn id="1" dur="indefinite" restart="never" nodeType="tmRoot"/>
-      </p:par>
-    </p:tnLst>
-  </p:timing>
-</p:sld>
-</file>
-
-<file path=ppt/slides/slide7.xml><?xml version="1.0" encoding="utf-8"?>
-<p:sld xmlns:a="http://schemas.openxmlformats.org/drawingml/2006/main" xmlns:r="http://schemas.openxmlformats.org/officeDocument/2006/relationships" xmlns:p="http://schemas.openxmlformats.org/presentationml/2006/main">
-  <p:cSld>
-    <p:spTree>
-      <p:nvGrpSpPr>
-        <p:cNvPr id="1" name=""/>
-        <p:cNvGrpSpPr/>
-        <p:nvPr/>
-      </p:nvGrpSpPr>
-      <p:grpSpPr>
-        <a:xfrm>
-          <a:off x="0" y="0"/>
-          <a:ext cx="0" cy="0"/>
-          <a:chOff x="0" y="0"/>
-          <a:chExt cx="0" cy="0"/>
-        </a:xfrm>
-      </p:grpSpPr>
-      <p:sp>
-        <p:nvSpPr>
-          <p:cNvPr id="2" name="Title 1"/>
-          <p:cNvSpPr>
-            <a:spLocks noGrp="1"/>
-          </p:cNvSpPr>
-          <p:nvPr>
-            <p:ph type="title"/>
-          </p:nvPr>
-        </p:nvSpPr>
-        <p:spPr/>
-        <p:txBody>
-          <a:bodyPr/>
-          <a:lstStyle/>
-          <a:p>
+              <a:t>-Evoked </a:t>
+            </a:r>
             <a:r>
               <a:rPr lang="en-US" dirty="0" smtClean="0"/>
-              <a:t>Stimulation-Evoked Movements</a:t>
+              <a:t>Movements</a:t>
             </a:r>
             <a:endParaRPr lang="en-US" dirty="0"/>
           </a:p>
@@ -4679,6 +4845,139 @@
     <p:extLst>
       <p:ext uri="{BB962C8B-B14F-4D97-AF65-F5344CB8AC3E}">
         <p14:creationId xmlns:p14="http://schemas.microsoft.com/office/powerpoint/2010/main" val="4112526323"/>
+      </p:ext>
+    </p:extLst>
+  </p:cSld>
+  <p:clrMapOvr>
+    <a:masterClrMapping/>
+  </p:clrMapOvr>
+  <p:timing>
+    <p:tnLst>
+      <p:par>
+        <p:cTn id="1" dur="indefinite" restart="never" nodeType="tmRoot"/>
+      </p:par>
+    </p:tnLst>
+  </p:timing>
+</p:sld>
+</file>
+
+<file path=ppt/slides/slide7.xml><?xml version="1.0" encoding="utf-8"?>
+<p:sld xmlns:a="http://schemas.openxmlformats.org/drawingml/2006/main" xmlns:r="http://schemas.openxmlformats.org/officeDocument/2006/relationships" xmlns:p="http://schemas.openxmlformats.org/presentationml/2006/main">
+  <p:cSld>
+    <p:spTree>
+      <p:nvGrpSpPr>
+        <p:cNvPr id="1" name=""/>
+        <p:cNvGrpSpPr/>
+        <p:nvPr/>
+      </p:nvGrpSpPr>
+      <p:grpSpPr>
+        <a:xfrm>
+          <a:off x="0" y="0"/>
+          <a:ext cx="0" cy="0"/>
+          <a:chOff x="0" y="0"/>
+          <a:chExt cx="0" cy="0"/>
+        </a:xfrm>
+      </p:grpSpPr>
+      <p:sp>
+        <p:nvSpPr>
+          <p:cNvPr id="2" name="Title 1"/>
+          <p:cNvSpPr>
+            <a:spLocks noGrp="1"/>
+          </p:cNvSpPr>
+          <p:nvPr>
+            <p:ph type="title"/>
+          </p:nvPr>
+        </p:nvSpPr>
+        <p:spPr/>
+        <p:txBody>
+          <a:bodyPr/>
+          <a:lstStyle/>
+          <a:p>
+            <a:r>
+              <a:rPr lang="en-US" dirty="0" smtClean="0"/>
+              <a:t>Latency of Eye and Head</a:t>
+            </a:r>
+            <a:endParaRPr lang="en-US" dirty="0"/>
+          </a:p>
+        </p:txBody>
+      </p:sp>
+      <p:pic>
+        <p:nvPicPr>
+          <p:cNvPr id="5" name="Picture 2" descr="C:\Users\adam2\Documents\MATLAB\NRGStimAnalysis\R analysis\NRGSTIM_files\figure-html\unnamed-chunk-2-1.png"/>
+          <p:cNvPicPr>
+            <a:picLocks noGrp="1" noChangeAspect="1" noChangeArrowheads="1"/>
+          </p:cNvPicPr>
+          <p:nvPr>
+            <p:ph idx="1"/>
+          </p:nvPr>
+        </p:nvPicPr>
+        <p:blipFill>
+          <a:blip r:embed="rId2">
+            <a:extLst>
+              <a:ext uri="{28A0092B-C50C-407E-A947-70E740481C1C}">
+                <a14:useLocalDpi xmlns:a14="http://schemas.microsoft.com/office/drawing/2010/main" val="0"/>
+              </a:ext>
+            </a:extLst>
+          </a:blip>
+          <a:srcRect/>
+          <a:stretch>
+            <a:fillRect/>
+          </a:stretch>
+        </p:blipFill>
+        <p:spPr bwMode="auto">
+          <a:xfrm>
+            <a:off x="1371600" y="1219200"/>
+            <a:ext cx="6336348" cy="4525963"/>
+          </a:xfrm>
+          <a:prstGeom prst="rect">
+            <a:avLst/>
+          </a:prstGeom>
+          <a:noFill/>
+          <a:extLst>
+            <a:ext uri="{909E8E84-426E-40DD-AFC4-6F175D3DCCD1}">
+              <a14:hiddenFill xmlns:a14="http://schemas.microsoft.com/office/drawing/2010/main">
+                <a:solidFill>
+                  <a:srgbClr val="FFFFFF"/>
+                </a:solidFill>
+              </a14:hiddenFill>
+            </a:ext>
+          </a:extLst>
+        </p:spPr>
+      </p:pic>
+      <p:sp>
+        <p:nvSpPr>
+          <p:cNvPr id="4" name="TextBox 3"/>
+          <p:cNvSpPr txBox="1"/>
+          <p:nvPr/>
+        </p:nvSpPr>
+        <p:spPr>
+          <a:xfrm>
+            <a:off x="990600" y="6096000"/>
+            <a:ext cx="7467600" cy="646331"/>
+          </a:xfrm>
+          <a:prstGeom prst="rect">
+            <a:avLst/>
+          </a:prstGeom>
+          <a:noFill/>
+        </p:spPr>
+        <p:txBody>
+          <a:bodyPr wrap="square" rtlCol="0">
+            <a:spAutoFit/>
+          </a:bodyPr>
+          <a:lstStyle/>
+          <a:p>
+            <a:r>
+              <a:rPr lang="en-US" dirty="0" smtClean="0"/>
+              <a:t>At each location, the eyes and head begin moving at about the same time. There is more variance in the calculated eye latency.</a:t>
+            </a:r>
+            <a:endParaRPr lang="en-US" dirty="0"/>
+          </a:p>
+        </p:txBody>
+      </p:sp>
+    </p:spTree>
+    <p:extLst>
+      <p:ext uri="{BB962C8B-B14F-4D97-AF65-F5344CB8AC3E}">
+        <p14:creationId xmlns:p14="http://schemas.microsoft.com/office/powerpoint/2010/main" val="2618370532"/>
       </p:ext>
     </p:extLst>
   </p:cSld>

</xml_diff>